<commit_message>
added coffee mug, added direct polly integration,
</commit_message>
<xml_diff>
--- a/docs/RecycleGuru.pptx
+++ b/docs/RecycleGuru.pptx
@@ -108,6 +108,11 @@
       </a:defRPr>
     </a:lvl9pPr>
   </p:defaultTextStyle>
+  <p:extLst>
+    <p:ext uri="{EFAFB233-063F-42B5-8137-9DF3F51BA10A}">
+      <p15:sldGuideLst xmlns:p15="http://schemas.microsoft.com/office/powerpoint/2012/main"/>
+    </p:ext>
+  </p:extLst>
 </p:presentation>
 </file>
 
@@ -193,7 +198,7 @@
           <a:p>
             <a:fld id="{3A5B4350-8C23-8E41-9600-F94D38B409E7}" type="datetimeFigureOut">
               <a:rPr lang="en-US" smtClean="0"/>
-              <a:t>10/29/19</a:t>
+              <a:t>10/30/19</a:t>
             </a:fld>
             <a:endParaRPr lang="en-US"/>
           </a:p>
@@ -691,7 +696,7 @@
           <a:p>
             <a:fld id="{54B92A0F-6B1E-9C46-B663-7B3B8226FD15}" type="datetimeFigureOut">
               <a:rPr lang="en-US" smtClean="0"/>
-              <a:t>10/29/19</a:t>
+              <a:t>10/30/19</a:t>
             </a:fld>
             <a:endParaRPr lang="en-US"/>
           </a:p>
@@ -889,7 +894,7 @@
           <a:p>
             <a:fld id="{54B92A0F-6B1E-9C46-B663-7B3B8226FD15}" type="datetimeFigureOut">
               <a:rPr lang="en-US" smtClean="0"/>
-              <a:t>10/29/19</a:t>
+              <a:t>10/30/19</a:t>
             </a:fld>
             <a:endParaRPr lang="en-US"/>
           </a:p>
@@ -1097,7 +1102,7 @@
           <a:p>
             <a:fld id="{54B92A0F-6B1E-9C46-B663-7B3B8226FD15}" type="datetimeFigureOut">
               <a:rPr lang="en-US" smtClean="0"/>
-              <a:t>10/29/19</a:t>
+              <a:t>10/30/19</a:t>
             </a:fld>
             <a:endParaRPr lang="en-US"/>
           </a:p>
@@ -1295,7 +1300,7 @@
           <a:p>
             <a:fld id="{54B92A0F-6B1E-9C46-B663-7B3B8226FD15}" type="datetimeFigureOut">
               <a:rPr lang="en-US" smtClean="0"/>
-              <a:t>10/29/19</a:t>
+              <a:t>10/30/19</a:t>
             </a:fld>
             <a:endParaRPr lang="en-US"/>
           </a:p>
@@ -1570,7 +1575,7 @@
           <a:p>
             <a:fld id="{54B92A0F-6B1E-9C46-B663-7B3B8226FD15}" type="datetimeFigureOut">
               <a:rPr lang="en-US" smtClean="0"/>
-              <a:t>10/29/19</a:t>
+              <a:t>10/30/19</a:t>
             </a:fld>
             <a:endParaRPr lang="en-US"/>
           </a:p>
@@ -1835,7 +1840,7 @@
           <a:p>
             <a:fld id="{54B92A0F-6B1E-9C46-B663-7B3B8226FD15}" type="datetimeFigureOut">
               <a:rPr lang="en-US" smtClean="0"/>
-              <a:t>10/29/19</a:t>
+              <a:t>10/30/19</a:t>
             </a:fld>
             <a:endParaRPr lang="en-US"/>
           </a:p>
@@ -2247,7 +2252,7 @@
           <a:p>
             <a:fld id="{54B92A0F-6B1E-9C46-B663-7B3B8226FD15}" type="datetimeFigureOut">
               <a:rPr lang="en-US" smtClean="0"/>
-              <a:t>10/29/19</a:t>
+              <a:t>10/30/19</a:t>
             </a:fld>
             <a:endParaRPr lang="en-US"/>
           </a:p>
@@ -2388,7 +2393,7 @@
           <a:p>
             <a:fld id="{54B92A0F-6B1E-9C46-B663-7B3B8226FD15}" type="datetimeFigureOut">
               <a:rPr lang="en-US" smtClean="0"/>
-              <a:t>10/29/19</a:t>
+              <a:t>10/30/19</a:t>
             </a:fld>
             <a:endParaRPr lang="en-US"/>
           </a:p>
@@ -2501,7 +2506,7 @@
           <a:p>
             <a:fld id="{54B92A0F-6B1E-9C46-B663-7B3B8226FD15}" type="datetimeFigureOut">
               <a:rPr lang="en-US" smtClean="0"/>
-              <a:t>10/29/19</a:t>
+              <a:t>10/30/19</a:t>
             </a:fld>
             <a:endParaRPr lang="en-US"/>
           </a:p>
@@ -2812,7 +2817,7 @@
           <a:p>
             <a:fld id="{54B92A0F-6B1E-9C46-B663-7B3B8226FD15}" type="datetimeFigureOut">
               <a:rPr lang="en-US" smtClean="0"/>
-              <a:t>10/29/19</a:t>
+              <a:t>10/30/19</a:t>
             </a:fld>
             <a:endParaRPr lang="en-US"/>
           </a:p>
@@ -3100,7 +3105,7 @@
           <a:p>
             <a:fld id="{54B92A0F-6B1E-9C46-B663-7B3B8226FD15}" type="datetimeFigureOut">
               <a:rPr lang="en-US" smtClean="0"/>
-              <a:t>10/29/19</a:t>
+              <a:t>10/30/19</a:t>
             </a:fld>
             <a:endParaRPr lang="en-US"/>
           </a:p>
@@ -3341,7 +3346,7 @@
           <a:p>
             <a:fld id="{54B92A0F-6B1E-9C46-B663-7B3B8226FD15}" type="datetimeFigureOut">
               <a:rPr lang="en-US" smtClean="0"/>
-              <a:t>10/29/19</a:t>
+              <a:t>10/30/19</a:t>
             </a:fld>
             <a:endParaRPr lang="en-US"/>
           </a:p>
@@ -4977,7 +4982,196 @@
           <a:p>
             <a:r>
               <a:rPr lang="en-US" dirty="0"/>
-              <a:t>POST Testing Images</a:t>
+              <a:t>POST Testing Image</a:t>
+            </a:r>
+          </a:p>
+        </p:txBody>
+      </p:sp>
+      <p:sp>
+        <p:nvSpPr>
+          <p:cNvPr id="31" name="TextBox 30">
+            <a:extLst>
+              <a:ext uri="{FF2B5EF4-FFF2-40B4-BE49-F238E27FC236}">
+                <a16:creationId xmlns:a16="http://schemas.microsoft.com/office/drawing/2014/main" id="{5917B1A6-19C4-E645-8E1D-5D782B78E938}"/>
+              </a:ext>
+            </a:extLst>
+          </p:cNvPr>
+          <p:cNvSpPr txBox="1"/>
+          <p:nvPr/>
+        </p:nvSpPr>
+        <p:spPr>
+          <a:xfrm>
+            <a:off x="7038475" y="3079208"/>
+            <a:ext cx="2301904" cy="307777"/>
+          </a:xfrm>
+          <a:prstGeom prst="rect">
+            <a:avLst/>
+          </a:prstGeom>
+          <a:noFill/>
+        </p:spPr>
+        <p:txBody>
+          <a:bodyPr wrap="square" rtlCol="0">
+            <a:spAutoFit/>
+          </a:bodyPr>
+          <a:lstStyle/>
+          <a:p>
+            <a:pPr algn="ctr"/>
+            <a:r>
+              <a:rPr lang="en-US" sz="1400" dirty="0"/>
+              <a:t>Amazon Polly</a:t>
+            </a:r>
+          </a:p>
+        </p:txBody>
+      </p:sp>
+      <p:pic>
+        <p:nvPicPr>
+          <p:cNvPr id="32" name="Graphic 31">
+            <a:extLst>
+              <a:ext uri="{FF2B5EF4-FFF2-40B4-BE49-F238E27FC236}">
+                <a16:creationId xmlns:a16="http://schemas.microsoft.com/office/drawing/2014/main" id="{3C8029E1-388C-464D-A82D-D1D4EB6FE90B}"/>
+              </a:ext>
+            </a:extLst>
+          </p:cNvPr>
+          <p:cNvPicPr>
+            <a:picLocks noChangeAspect="1"/>
+          </p:cNvPicPr>
+          <p:nvPr/>
+        </p:nvPicPr>
+        <p:blipFill>
+          <a:blip r:embed="rId21">
+            <a:extLst>
+              <a:ext uri="{96DAC541-7B7A-43D3-8B79-37D633B846F1}">
+                <asvg:svgBlip xmlns:asvg="http://schemas.microsoft.com/office/drawing/2016/SVG/main" r:embed="rId22"/>
+              </a:ext>
+            </a:extLst>
+          </a:blip>
+          <a:stretch>
+            <a:fillRect/>
+          </a:stretch>
+        </p:blipFill>
+        <p:spPr>
+          <a:xfrm>
+            <a:off x="7833827" y="2306704"/>
+            <a:ext cx="711200" cy="711200"/>
+          </a:xfrm>
+          <a:prstGeom prst="rect">
+            <a:avLst/>
+          </a:prstGeom>
+        </p:spPr>
+      </p:pic>
+      <p:sp>
+        <p:nvSpPr>
+          <p:cNvPr id="13" name="TextBox 12">
+            <a:extLst>
+              <a:ext uri="{FF2B5EF4-FFF2-40B4-BE49-F238E27FC236}">
+                <a16:creationId xmlns:a16="http://schemas.microsoft.com/office/drawing/2014/main" id="{39AA0825-833C-B044-8FF5-A6444A0FA595}"/>
+              </a:ext>
+            </a:extLst>
+          </p:cNvPr>
+          <p:cNvSpPr txBox="1"/>
+          <p:nvPr/>
+        </p:nvSpPr>
+        <p:spPr>
+          <a:xfrm>
+            <a:off x="9790331" y="3899471"/>
+            <a:ext cx="1300612" cy="307777"/>
+          </a:xfrm>
+          <a:prstGeom prst="rect">
+            <a:avLst/>
+          </a:prstGeom>
+          <a:noFill/>
+        </p:spPr>
+        <p:txBody>
+          <a:bodyPr wrap="none" rtlCol="0">
+            <a:spAutoFit/>
+          </a:bodyPr>
+          <a:lstStyle/>
+          <a:p>
+            <a:r>
+              <a:rPr lang="en-US" sz="1400" dirty="0"/>
+              <a:t>Post test image</a:t>
+            </a:r>
+          </a:p>
+        </p:txBody>
+      </p:sp>
+      <p:cxnSp>
+        <p:nvCxnSpPr>
+          <p:cNvPr id="33" name="Straight Arrow Connector 32">
+            <a:extLst>
+              <a:ext uri="{FF2B5EF4-FFF2-40B4-BE49-F238E27FC236}">
+                <a16:creationId xmlns:a16="http://schemas.microsoft.com/office/drawing/2014/main" id="{6C2EFB8E-B5DD-CF49-BE4F-C342D88BD826}"/>
+              </a:ext>
+            </a:extLst>
+          </p:cNvPr>
+          <p:cNvCxnSpPr>
+            <a:cxnSpLocks/>
+            <a:stCxn id="29" idx="3"/>
+            <a:endCxn id="31" idx="2"/>
+          </p:cNvCxnSpPr>
+          <p:nvPr/>
+        </p:nvCxnSpPr>
+        <p:spPr>
+          <a:xfrm flipH="1" flipV="1">
+            <a:off x="8189427" y="3386985"/>
+            <a:ext cx="1348646" cy="1519912"/>
+          </a:xfrm>
+          <a:prstGeom prst="straightConnector1">
+            <a:avLst/>
+          </a:prstGeom>
+          <a:ln w="12700">
+            <a:solidFill>
+              <a:srgbClr val="545B64"/>
+            </a:solidFill>
+            <a:headEnd type="none" w="med" len="sm"/>
+            <a:tailEnd type="arrow" w="med" len="sm"/>
+          </a:ln>
+        </p:spPr>
+        <p:style>
+          <a:lnRef idx="1">
+            <a:schemeClr val="accent1"/>
+          </a:lnRef>
+          <a:fillRef idx="0">
+            <a:schemeClr val="accent1"/>
+          </a:fillRef>
+          <a:effectRef idx="0">
+            <a:schemeClr val="accent1"/>
+          </a:effectRef>
+          <a:fontRef idx="minor">
+            <a:schemeClr val="tx1"/>
+          </a:fontRef>
+        </p:style>
+      </p:cxnSp>
+      <p:sp>
+        <p:nvSpPr>
+          <p:cNvPr id="36" name="TextBox 35">
+            <a:extLst>
+              <a:ext uri="{FF2B5EF4-FFF2-40B4-BE49-F238E27FC236}">
+                <a16:creationId xmlns:a16="http://schemas.microsoft.com/office/drawing/2014/main" id="{0BC8420D-3291-974F-A8B5-529BD97B50D9}"/>
+              </a:ext>
+            </a:extLst>
+          </p:cNvPr>
+          <p:cNvSpPr txBox="1"/>
+          <p:nvPr/>
+        </p:nvSpPr>
+        <p:spPr>
+          <a:xfrm>
+            <a:off x="7482403" y="4062161"/>
+            <a:ext cx="1348647" cy="738664"/>
+          </a:xfrm>
+          <a:prstGeom prst="rect">
+            <a:avLst/>
+          </a:prstGeom>
+          <a:noFill/>
+        </p:spPr>
+        <p:txBody>
+          <a:bodyPr wrap="square" rtlCol="0">
+            <a:spAutoFit/>
+          </a:bodyPr>
+          <a:lstStyle/>
+          <a:p>
+            <a:r>
+              <a:rPr lang="en-US" sz="1400" dirty="0"/>
+              <a:t>Create audio response from prediction</a:t>
             </a:r>
           </a:p>
         </p:txBody>

</xml_diff>